<commit_message>
changes to altmetrics talk
</commit_message>
<xml_diff>
--- a/canpolintalk/scott.pptx
+++ b/canpolintalk/scott.pptx
@@ -7,7 +7,7 @@
   <p:sldIdLst>
     <p:sldId id="256" r:id="rId2"/>
     <p:sldId id="270" r:id="rId3"/>
-    <p:sldId id="257" r:id="rId4"/>
+    <p:sldId id="275" r:id="rId4"/>
     <p:sldId id="258" r:id="rId5"/>
     <p:sldId id="271" r:id="rId6"/>
     <p:sldId id="259" r:id="rId7"/>
@@ -18,10 +18,10 @@
     <p:sldId id="262" r:id="rId12"/>
     <p:sldId id="268" r:id="rId13"/>
     <p:sldId id="265" r:id="rId14"/>
-    <p:sldId id="264" r:id="rId15"/>
-    <p:sldId id="273" r:id="rId16"/>
-    <p:sldId id="272" r:id="rId17"/>
-    <p:sldId id="274" r:id="rId18"/>
+    <p:sldId id="273" r:id="rId15"/>
+    <p:sldId id="264" r:id="rId16"/>
+    <p:sldId id="274" r:id="rId17"/>
+    <p:sldId id="272" r:id="rId18"/>
     <p:sldId id="266" r:id="rId19"/>
   </p:sldIdLst>
   <p:sldSz cx="9144000" cy="6858000" type="screen4x3"/>
@@ -304,7 +304,7 @@
           <a:lstStyle/>
           <a:p>
             <a:fld id="{BE27739B-E857-3B43-B927-3CD6D8B6A632}" type="datetimeFigureOut">
-              <a:t>2013-10-15</a:t>
+              <a:t>2013-10-16</a:t>
             </a:fld>
             <a:endParaRPr lang="en-US"/>
           </a:p>
@@ -472,7 +472,7 @@
           <a:lstStyle/>
           <a:p>
             <a:fld id="{BE27739B-E857-3B43-B927-3CD6D8B6A632}" type="datetimeFigureOut">
-              <a:t>2013-10-15</a:t>
+              <a:t>2013-10-16</a:t>
             </a:fld>
             <a:endParaRPr lang="en-US"/>
           </a:p>
@@ -650,7 +650,7 @@
           <a:lstStyle/>
           <a:p>
             <a:fld id="{BE27739B-E857-3B43-B927-3CD6D8B6A632}" type="datetimeFigureOut">
-              <a:t>2013-10-15</a:t>
+              <a:t>2013-10-16</a:t>
             </a:fld>
             <a:endParaRPr lang="en-US"/>
           </a:p>
@@ -818,7 +818,7 @@
           <a:lstStyle/>
           <a:p>
             <a:fld id="{BE27739B-E857-3B43-B927-3CD6D8B6A632}" type="datetimeFigureOut">
-              <a:t>2013-10-15</a:t>
+              <a:t>2013-10-16</a:t>
             </a:fld>
             <a:endParaRPr lang="en-US"/>
           </a:p>
@@ -1062,7 +1062,7 @@
           <a:lstStyle/>
           <a:p>
             <a:fld id="{BE27739B-E857-3B43-B927-3CD6D8B6A632}" type="datetimeFigureOut">
-              <a:t>2013-10-15</a:t>
+              <a:t>2013-10-16</a:t>
             </a:fld>
             <a:endParaRPr lang="en-US"/>
           </a:p>
@@ -1348,7 +1348,7 @@
           <a:lstStyle/>
           <a:p>
             <a:fld id="{BE27739B-E857-3B43-B927-3CD6D8B6A632}" type="datetimeFigureOut">
-              <a:t>2013-10-15</a:t>
+              <a:t>2013-10-16</a:t>
             </a:fld>
             <a:endParaRPr lang="en-US"/>
           </a:p>
@@ -1768,7 +1768,7 @@
           <a:lstStyle/>
           <a:p>
             <a:fld id="{BE27739B-E857-3B43-B927-3CD6D8B6A632}" type="datetimeFigureOut">
-              <a:t>2013-10-15</a:t>
+              <a:t>2013-10-16</a:t>
             </a:fld>
             <a:endParaRPr lang="en-US"/>
           </a:p>
@@ -1884,7 +1884,7 @@
           <a:lstStyle/>
           <a:p>
             <a:fld id="{BE27739B-E857-3B43-B927-3CD6D8B6A632}" type="datetimeFigureOut">
-              <a:t>2013-10-15</a:t>
+              <a:t>2013-10-16</a:t>
             </a:fld>
             <a:endParaRPr lang="en-US"/>
           </a:p>
@@ -1977,7 +1977,7 @@
           <a:lstStyle/>
           <a:p>
             <a:fld id="{BE27739B-E857-3B43-B927-3CD6D8B6A632}" type="datetimeFigureOut">
-              <a:t>2013-10-15</a:t>
+              <a:t>2013-10-16</a:t>
             </a:fld>
             <a:endParaRPr lang="en-US"/>
           </a:p>
@@ -2252,7 +2252,7 @@
           <a:lstStyle/>
           <a:p>
             <a:fld id="{BE27739B-E857-3B43-B927-3CD6D8B6A632}" type="datetimeFigureOut">
-              <a:t>2013-10-15</a:t>
+              <a:t>2013-10-16</a:t>
             </a:fld>
             <a:endParaRPr lang="en-US"/>
           </a:p>
@@ -2506,7 +2506,7 @@
           <a:lstStyle/>
           <a:p>
             <a:fld id="{BE27739B-E857-3B43-B927-3CD6D8B6A632}" type="datetimeFigureOut">
-              <a:t>2013-10-15</a:t>
+              <a:t>2013-10-16</a:t>
             </a:fld>
             <a:endParaRPr lang="en-US"/>
           </a:p>
@@ -2717,7 +2717,7 @@
           </a:lstStyle>
           <a:p>
             <a:fld id="{BE27739B-E857-3B43-B927-3CD6D8B6A632}" type="datetimeFigureOut">
-              <a:t>2013-10-15</a:t>
+              <a:t>2013-10-16</a:t>
             </a:fld>
             <a:endParaRPr lang="en-US"/>
           </a:p>
@@ -3115,7 +3115,7 @@
           <a:p>
             <a:r>
               <a:rPr lang="en-US"/>
-              <a:t>Contribution of traits, phenology, &amp; phylogenetic history to plant-pollinator network</a:t>
+              <a:t>Contribution of traits, phenology, &amp; phylogenetic history to plant-pollinator network structure</a:t>
             </a:r>
           </a:p>
         </p:txBody>
@@ -3693,6 +3693,33 @@
           <a:p>
             <a:r>
               <a:rPr lang="en-US"/>
+              <a:t>Species level</a:t>
+            </a:r>
+          </a:p>
+          <a:p>
+            <a:pPr lvl="1"/>
+            <a:r>
+              <a:rPr lang="en-US"/>
+              <a:t>Sociality important in pollinators</a:t>
+            </a:r>
+          </a:p>
+          <a:p>
+            <a:pPr lvl="1"/>
+            <a:r>
+              <a:rPr lang="en-US"/>
+              <a:t>Mating systems, flower symmetry &amp; growth form important in plants</a:t>
+            </a:r>
+          </a:p>
+          <a:p>
+            <a:pPr lvl="1"/>
+            <a:r>
+              <a:rPr lang="en-US"/>
+              <a:t>Phenology playing role  - will explore more</a:t>
+            </a:r>
+          </a:p>
+          <a:p>
+            <a:r>
+              <a:rPr lang="en-US"/>
               <a:t>Network level</a:t>
             </a:r>
           </a:p>
@@ -3747,33 +3774,6 @@
             <a:r>
               <a:rPr lang="en-US"/>
               <a:t>Pollinator traits bigger drivers of network structure relative to plants</a:t>
-            </a:r>
-          </a:p>
-          <a:p>
-            <a:r>
-              <a:rPr lang="en-US"/>
-              <a:t>Species level</a:t>
-            </a:r>
-          </a:p>
-          <a:p>
-            <a:pPr lvl="1"/>
-            <a:r>
-              <a:rPr lang="en-US"/>
-              <a:t>Sociality important in pollinators</a:t>
-            </a:r>
-          </a:p>
-          <a:p>
-            <a:pPr lvl="1"/>
-            <a:r>
-              <a:rPr lang="en-US"/>
-              <a:t>Mating systems, flower symmetry &amp; growth form important in plants</a:t>
-            </a:r>
-          </a:p>
-          <a:p>
-            <a:pPr lvl="1"/>
-            <a:r>
-              <a:rPr lang="en-US"/>
-              <a:t>Phenology playing role  - will explore more</a:t>
             </a:r>
           </a:p>
         </p:txBody>
@@ -3792,6 +3792,87 @@
 </file>
 
 <file path=ppt/slides/slide14.xml><?xml version="1.0" encoding="utf-8"?>
+<p:sld xmlns:a="http://schemas.openxmlformats.org/drawingml/2006/main" xmlns:r="http://schemas.openxmlformats.org/officeDocument/2006/relationships" xmlns:p="http://schemas.openxmlformats.org/presentationml/2006/main">
+  <p:cSld>
+    <p:spTree>
+      <p:nvGrpSpPr>
+        <p:cNvPr id="1" name=""/>
+        <p:cNvGrpSpPr/>
+        <p:nvPr/>
+      </p:nvGrpSpPr>
+      <p:grpSpPr>
+        <a:xfrm>
+          <a:off x="0" y="0"/>
+          <a:ext cx="0" cy="0"/>
+          <a:chOff x="0" y="0"/>
+          <a:chExt cx="0" cy="0"/>
+        </a:xfrm>
+      </p:grpSpPr>
+      <p:sp>
+        <p:nvSpPr>
+          <p:cNvPr id="2" name="Title 1"/>
+          <p:cNvSpPr>
+            <a:spLocks noGrp="1"/>
+          </p:cNvSpPr>
+          <p:nvPr>
+            <p:ph type="title"/>
+          </p:nvPr>
+        </p:nvSpPr>
+        <p:spPr/>
+        <p:txBody>
+          <a:bodyPr/>
+          <a:lstStyle/>
+          <a:p>
+            <a:r>
+              <a:rPr lang="en-US"/>
+              <a:t>Phenology</a:t>
+            </a:r>
+          </a:p>
+        </p:txBody>
+      </p:sp>
+      <p:sp>
+        <p:nvSpPr>
+          <p:cNvPr id="3" name="Content Placeholder 2"/>
+          <p:cNvSpPr>
+            <a:spLocks noGrp="1"/>
+          </p:cNvSpPr>
+          <p:nvPr>
+            <p:ph idx="1"/>
+          </p:nvPr>
+        </p:nvSpPr>
+        <p:spPr/>
+        <p:txBody>
+          <a:bodyPr/>
+          <a:lstStyle/>
+          <a:p>
+            <a:r>
+              <a:rPr lang="en-US"/>
+              <a:t>Species vary in when they start flowering (plants) and start flying (pollinators)</a:t>
+            </a:r>
+          </a:p>
+          <a:p>
+            <a:r>
+              <a:rPr lang="en-US"/>
+              <a:t>Variation among species can lead to changes in network structure</a:t>
+            </a:r>
+            <a:endParaRPr lang="en-US"/>
+          </a:p>
+        </p:txBody>
+      </p:sp>
+    </p:spTree>
+    <p:extLst>
+      <p:ext uri="{BB962C8B-B14F-4D97-AF65-F5344CB8AC3E}">
+        <p14:creationId xmlns:p14="http://schemas.microsoft.com/office/powerpoint/2010/main" val="578812740"/>
+      </p:ext>
+    </p:extLst>
+  </p:cSld>
+  <p:clrMapOvr>
+    <a:masterClrMapping/>
+  </p:clrMapOvr>
+</p:sld>
+</file>
+
+<file path=ppt/slides/slide15.xml><?xml version="1.0" encoding="utf-8"?>
 <p:sld xmlns:a="http://schemas.openxmlformats.org/drawingml/2006/main" xmlns:r="http://schemas.openxmlformats.org/officeDocument/2006/relationships" xmlns:p="http://schemas.openxmlformats.org/presentationml/2006/main">
   <p:cSld>
     <p:spTree>
@@ -4002,77 +4083,6 @@
 </p:sld>
 </file>
 
-<file path=ppt/slides/slide15.xml><?xml version="1.0" encoding="utf-8"?>
-<p:sld xmlns:a="http://schemas.openxmlformats.org/drawingml/2006/main" xmlns:r="http://schemas.openxmlformats.org/officeDocument/2006/relationships" xmlns:p="http://schemas.openxmlformats.org/presentationml/2006/main">
-  <p:cSld>
-    <p:spTree>
-      <p:nvGrpSpPr>
-        <p:cNvPr id="1" name=""/>
-        <p:cNvGrpSpPr/>
-        <p:nvPr/>
-      </p:nvGrpSpPr>
-      <p:grpSpPr>
-        <a:xfrm>
-          <a:off x="0" y="0"/>
-          <a:ext cx="0" cy="0"/>
-          <a:chOff x="0" y="0"/>
-          <a:chExt cx="0" cy="0"/>
-        </a:xfrm>
-      </p:grpSpPr>
-      <p:sp>
-        <p:nvSpPr>
-          <p:cNvPr id="2" name="Title 1"/>
-          <p:cNvSpPr>
-            <a:spLocks noGrp="1"/>
-          </p:cNvSpPr>
-          <p:nvPr>
-            <p:ph type="title"/>
-          </p:nvPr>
-        </p:nvSpPr>
-        <p:spPr/>
-        <p:txBody>
-          <a:bodyPr/>
-          <a:lstStyle/>
-          <a:p>
-            <a:r>
-              <a:rPr lang="en-US"/>
-              <a:t>Phenology</a:t>
-            </a:r>
-          </a:p>
-        </p:txBody>
-      </p:sp>
-      <p:sp>
-        <p:nvSpPr>
-          <p:cNvPr id="3" name="Content Placeholder 2"/>
-          <p:cNvSpPr>
-            <a:spLocks noGrp="1"/>
-          </p:cNvSpPr>
-          <p:nvPr>
-            <p:ph idx="1"/>
-          </p:nvPr>
-        </p:nvSpPr>
-        <p:spPr/>
-        <p:txBody>
-          <a:bodyPr/>
-          <a:lstStyle/>
-          <a:p>
-            <a:endParaRPr lang="en-US"/>
-          </a:p>
-        </p:txBody>
-      </p:sp>
-    </p:spTree>
-    <p:extLst>
-      <p:ext uri="{BB962C8B-B14F-4D97-AF65-F5344CB8AC3E}">
-        <p14:creationId xmlns:p14="http://schemas.microsoft.com/office/powerpoint/2010/main" val="578812740"/>
-      </p:ext>
-    </p:extLst>
-  </p:cSld>
-  <p:clrMapOvr>
-    <a:masterClrMapping/>
-  </p:clrMapOvr>
-</p:sld>
-</file>
-
 <file path=ppt/slides/slide16.xml><?xml version="1.0" encoding="utf-8"?>
 <p:sld xmlns:a="http://schemas.openxmlformats.org/drawingml/2006/main" xmlns:r="http://schemas.openxmlformats.org/officeDocument/2006/relationships" xmlns:p="http://schemas.openxmlformats.org/presentationml/2006/main">
   <p:cSld>
@@ -4112,101 +4122,59 @@
           </a:p>
         </p:txBody>
       </p:sp>
-      <p:pic>
-        <p:nvPicPr>
-          <p:cNvPr id="7" name="Picture 6" descr="fig5.pdf"/>
-          <p:cNvPicPr>
-            <a:picLocks noChangeAspect="1"/>
-          </p:cNvPicPr>
-          <p:nvPr/>
-        </p:nvPicPr>
-        <p:blipFill rotWithShape="1">
-          <a:blip r:embed="rId2">
-            <a:extLst>
-              <a:ext uri="{28A0092B-C50C-407E-A947-70E740481C1C}">
-                <a14:useLocalDpi xmlns:a14="http://schemas.microsoft.com/office/drawing/2010/main" val="0"/>
-              </a:ext>
-            </a:extLst>
-          </a:blip>
-          <a:srcRect l="5313" t="2600" r="50186" b="68105"/>
-          <a:stretch/>
-        </p:blipFill>
-        <p:spPr>
-          <a:xfrm>
-            <a:off x="4954960" y="4102100"/>
-            <a:ext cx="3541340" cy="2527300"/>
-          </a:xfrm>
-          <a:prstGeom prst="rect">
-            <a:avLst/>
-          </a:prstGeom>
-        </p:spPr>
-      </p:pic>
-      <p:pic>
-        <p:nvPicPr>
-          <p:cNvPr id="8" name="Picture 7" descr="fig3_withsig_new_new.pdf"/>
-          <p:cNvPicPr>
-            <a:picLocks noChangeAspect="1"/>
-          </p:cNvPicPr>
-          <p:nvPr/>
-        </p:nvPicPr>
-        <p:blipFill rotWithShape="1">
-          <a:blip r:embed="rId3">
-            <a:extLst>
-              <a:ext uri="{28A0092B-C50C-407E-A947-70E740481C1C}">
-                <a14:useLocalDpi xmlns:a14="http://schemas.microsoft.com/office/drawing/2010/main" val="0"/>
-              </a:ext>
-            </a:extLst>
-          </a:blip>
-          <a:srcRect l="6713" t="62302" r="45834" b="5556"/>
-          <a:stretch/>
-        </p:blipFill>
-        <p:spPr>
-          <a:xfrm>
-            <a:off x="4954960" y="1270000"/>
-            <a:ext cx="3439191" cy="2717800"/>
-          </a:xfrm>
-          <a:prstGeom prst="rect">
-            <a:avLst/>
-          </a:prstGeom>
-        </p:spPr>
-      </p:pic>
-      <p:pic>
-        <p:nvPicPr>
-          <p:cNvPr id="9" name="Picture 8" descr="fig1_new.jpg"/>
-          <p:cNvPicPr>
-            <a:picLocks noChangeAspect="1"/>
-          </p:cNvPicPr>
-          <p:nvPr/>
-        </p:nvPicPr>
-        <p:blipFill>
-          <a:blip r:embed="rId4">
-            <a:extLst>
-              <a:ext uri="{28A0092B-C50C-407E-A947-70E740481C1C}">
-                <a14:useLocalDpi xmlns:a14="http://schemas.microsoft.com/office/drawing/2010/main" val="0"/>
-              </a:ext>
-            </a:extLst>
-          </a:blip>
-          <a:stretch>
-            <a:fillRect/>
-          </a:stretch>
-        </p:blipFill>
-        <p:spPr>
-          <a:xfrm>
-            <a:off x="559406" y="1454150"/>
-            <a:ext cx="3538842" cy="4610100"/>
-          </a:xfrm>
-          <a:prstGeom prst="rect">
-            <a:avLst/>
-          </a:prstGeom>
-          <a:solidFill>
-            <a:schemeClr val="tx1"/>
-          </a:solidFill>
-        </p:spPr>
-      </p:pic>
+      <p:sp>
+        <p:nvSpPr>
+          <p:cNvPr id="3" name="Content Placeholder 2"/>
+          <p:cNvSpPr>
+            <a:spLocks noGrp="1"/>
+          </p:cNvSpPr>
+          <p:nvPr>
+            <p:ph idx="1"/>
+          </p:nvPr>
+        </p:nvSpPr>
+        <p:spPr/>
+        <p:txBody>
+          <a:bodyPr/>
+          <a:lstStyle/>
+          <a:p>
+            <a:r>
+              <a:rPr lang="en-US"/>
+              <a:t>Shape easily measured</a:t>
+            </a:r>
+          </a:p>
+          <a:p>
+            <a:r>
+              <a:rPr lang="en-US"/>
+              <a:t>Metrics represent whether </a:t>
+            </a:r>
+          </a:p>
+          <a:p>
+            <a:pPr lvl="1"/>
+            <a:r>
+              <a:rPr lang="en-US"/>
+              <a:t>Branching events recent or old</a:t>
+            </a:r>
+          </a:p>
+          <a:p>
+            <a:pPr lvl="1"/>
+            <a:r>
+              <a:rPr lang="en-US"/>
+              <a:t>Branching events even across tree, or some groups speciate more than others</a:t>
+            </a:r>
+          </a:p>
+          <a:p>
+            <a:r>
+              <a:rPr lang="en-US"/>
+              <a:t>This “shape” could influence who interacts with who</a:t>
+            </a:r>
+            <a:endParaRPr lang="en-US"/>
+          </a:p>
+        </p:txBody>
+      </p:sp>
     </p:spTree>
     <p:extLst>
       <p:ext uri="{BB962C8B-B14F-4D97-AF65-F5344CB8AC3E}">
-        <p14:creationId xmlns:p14="http://schemas.microsoft.com/office/powerpoint/2010/main" val="2690475177"/>
+        <p14:creationId xmlns:p14="http://schemas.microsoft.com/office/powerpoint/2010/main" val="2900345323"/>
       </p:ext>
     </p:extLst>
   </p:cSld>
@@ -4255,29 +4223,180 @@
           </a:p>
         </p:txBody>
       </p:sp>
-      <p:sp>
-        <p:nvSpPr>
-          <p:cNvPr id="3" name="Content Placeholder 2"/>
-          <p:cNvSpPr>
-            <a:spLocks noGrp="1"/>
-          </p:cNvSpPr>
-          <p:nvPr>
-            <p:ph idx="1"/>
-          </p:nvPr>
-        </p:nvSpPr>
-        <p:spPr/>
-        <p:txBody>
-          <a:bodyPr/>
-          <a:lstStyle/>
-          <a:p>
-            <a:endParaRPr lang="en-US"/>
+      <p:pic>
+        <p:nvPicPr>
+          <p:cNvPr id="7" name="Picture 6" descr="fig5.pdf"/>
+          <p:cNvPicPr>
+            <a:picLocks noChangeAspect="1"/>
+          </p:cNvPicPr>
+          <p:nvPr/>
+        </p:nvPicPr>
+        <p:blipFill rotWithShape="1">
+          <a:blip r:embed="rId2">
+            <a:extLst>
+              <a:ext uri="{28A0092B-C50C-407E-A947-70E740481C1C}">
+                <a14:useLocalDpi xmlns:a14="http://schemas.microsoft.com/office/drawing/2010/main" val="0"/>
+              </a:ext>
+            </a:extLst>
+          </a:blip>
+          <a:srcRect l="5313" t="2600" r="50186" b="68105"/>
+          <a:stretch/>
+        </p:blipFill>
+        <p:spPr>
+          <a:xfrm>
+            <a:off x="4896258" y="4253981"/>
+            <a:ext cx="3541340" cy="2527300"/>
+          </a:xfrm>
+          <a:prstGeom prst="rect">
+            <a:avLst/>
+          </a:prstGeom>
+        </p:spPr>
+      </p:pic>
+      <p:pic>
+        <p:nvPicPr>
+          <p:cNvPr id="9" name="Picture 8" descr="fig1_new.jpg"/>
+          <p:cNvPicPr>
+            <a:picLocks noChangeAspect="1"/>
+          </p:cNvPicPr>
+          <p:nvPr/>
+        </p:nvPicPr>
+        <p:blipFill rotWithShape="1">
+          <a:blip r:embed="rId3">
+            <a:extLst>
+              <a:ext uri="{28A0092B-C50C-407E-A947-70E740481C1C}">
+                <a14:useLocalDpi xmlns:a14="http://schemas.microsoft.com/office/drawing/2010/main" val="0"/>
+              </a:ext>
+            </a:extLst>
+          </a:blip>
+          <a:srcRect t="49753"/>
+          <a:stretch/>
+        </p:blipFill>
+        <p:spPr>
+          <a:xfrm>
+            <a:off x="259406" y="4019493"/>
+            <a:ext cx="4103361" cy="2685943"/>
+          </a:xfrm>
+          <a:prstGeom prst="rect">
+            <a:avLst/>
+          </a:prstGeom>
+          <a:solidFill>
+            <a:schemeClr val="tx1"/>
+          </a:solidFill>
+        </p:spPr>
+      </p:pic>
+      <p:pic>
+        <p:nvPicPr>
+          <p:cNvPr id="3" name="Picture 2"/>
+          <p:cNvPicPr>
+            <a:picLocks noChangeAspect="1"/>
+          </p:cNvPicPr>
+          <p:nvPr/>
+        </p:nvPicPr>
+        <p:blipFill>
+          <a:blip r:embed="rId4"/>
+          <a:stretch>
+            <a:fillRect/>
+          </a:stretch>
+        </p:blipFill>
+        <p:spPr>
+          <a:xfrm>
+            <a:off x="6366525" y="5517631"/>
+            <a:ext cx="1803400" cy="1003300"/>
+          </a:xfrm>
+          <a:prstGeom prst="rect">
+            <a:avLst/>
+          </a:prstGeom>
+        </p:spPr>
+      </p:pic>
+      <p:pic>
+        <p:nvPicPr>
+          <p:cNvPr id="4" name="Picture 3"/>
+          <p:cNvPicPr>
+            <a:picLocks noChangeAspect="1"/>
+          </p:cNvPicPr>
+          <p:nvPr/>
+        </p:nvPicPr>
+        <p:blipFill>
+          <a:blip r:embed="rId5"/>
+          <a:stretch>
+            <a:fillRect/>
+          </a:stretch>
+        </p:blipFill>
+        <p:spPr>
+          <a:xfrm>
+            <a:off x="4954960" y="1206637"/>
+            <a:ext cx="3482638" cy="2958605"/>
+          </a:xfrm>
+          <a:prstGeom prst="rect">
+            <a:avLst/>
+          </a:prstGeom>
+        </p:spPr>
+      </p:pic>
+      <p:pic>
+        <p:nvPicPr>
+          <p:cNvPr id="10" name="Picture 9" descr="fig1_new.jpg"/>
+          <p:cNvPicPr>
+            <a:picLocks noChangeAspect="1"/>
+          </p:cNvPicPr>
+          <p:nvPr/>
+        </p:nvPicPr>
+        <p:blipFill rotWithShape="1">
+          <a:blip r:embed="rId3">
+            <a:extLst>
+              <a:ext uri="{28A0092B-C50C-407E-A947-70E740481C1C}">
+                <a14:useLocalDpi xmlns:a14="http://schemas.microsoft.com/office/drawing/2010/main" val="0"/>
+              </a:ext>
+            </a:extLst>
+          </a:blip>
+          <a:srcRect t="1116" b="50585"/>
+          <a:stretch/>
+        </p:blipFill>
+        <p:spPr>
+          <a:xfrm>
+            <a:off x="259406" y="1343960"/>
+            <a:ext cx="4103361" cy="2581837"/>
+          </a:xfrm>
+          <a:prstGeom prst="rect">
+            <a:avLst/>
+          </a:prstGeom>
+          <a:solidFill>
+            <a:schemeClr val="tx1"/>
+          </a:solidFill>
+        </p:spPr>
+      </p:pic>
+      <p:sp>
+        <p:nvSpPr>
+          <p:cNvPr id="5" name="TextBox 4"/>
+          <p:cNvSpPr txBox="1"/>
+          <p:nvPr/>
+        </p:nvSpPr>
+        <p:spPr>
+          <a:xfrm rot="5400000">
+            <a:off x="8074249" y="5332965"/>
+            <a:ext cx="1225102" cy="369332"/>
+          </a:xfrm>
+          <a:prstGeom prst="rect">
+            <a:avLst/>
+          </a:prstGeom>
+          <a:noFill/>
+        </p:spPr>
+        <p:txBody>
+          <a:bodyPr wrap="none" rtlCol="0">
+            <a:spAutoFit/>
+          </a:bodyPr>
+          <a:lstStyle/>
+          <a:p>
+            <a:r>
+              <a:rPr lang="en-US"/>
+              <a:t>Modularity</a:t>
+            </a:r>
           </a:p>
         </p:txBody>
       </p:sp>
     </p:spTree>
     <p:extLst>
       <p:ext uri="{BB962C8B-B14F-4D97-AF65-F5344CB8AC3E}">
-        <p14:creationId xmlns:p14="http://schemas.microsoft.com/office/powerpoint/2010/main" val="2900345323"/>
+        <p14:creationId xmlns:p14="http://schemas.microsoft.com/office/powerpoint/2010/main" val="2690475177"/>
       </p:ext>
     </p:extLst>
   </p:cSld>
@@ -4339,7 +4458,7 @@
         <p:spPr/>
         <p:txBody>
           <a:bodyPr>
-            <a:normAutofit fontScale="92500" lnSpcReduction="20000"/>
+            <a:normAutofit lnSpcReduction="10000"/>
           </a:bodyPr>
           <a:lstStyle/>
           <a:p>
@@ -4390,16 +4509,7 @@
             </a:pPr>
             <a:r>
               <a:rPr lang="en-US"/>
-              <a:t>Funding: NSERC – </a:t>
-            </a:r>
-          </a:p>
-          <a:p>
-            <a:pPr marL="0" indent="0">
-              <a:buNone/>
-            </a:pPr>
-            <a:r>
-              <a:rPr lang="en-US"/>
-              <a:t>CANPOLIN</a:t>
+              <a:t>Funding:</a:t>
             </a:r>
           </a:p>
         </p:txBody>
@@ -4420,7 +4530,7 @@
         </p:blipFill>
         <p:spPr>
           <a:xfrm>
-            <a:off x="3414524" y="4486037"/>
+            <a:off x="3339822" y="5102382"/>
             <a:ext cx="4528408" cy="1505064"/>
           </a:xfrm>
           <a:prstGeom prst="rect">
@@ -4527,7 +4637,7 @@
           <a:p>
             <a:r>
               <a:rPr lang="en-US"/>
-              <a:t>And many more…</a:t>
+              <a:t>And many more that provided data…</a:t>
             </a:r>
           </a:p>
           <a:p>
@@ -4545,6 +4655,13 @@
   <p:clrMapOvr>
     <a:masterClrMapping/>
   </p:clrMapOvr>
+  <p:timing>
+    <p:tnLst>
+      <p:par>
+        <p:cTn xmlns:p14="http://schemas.microsoft.com/office/powerpoint/2010/main" id="1" dur="indefinite" restart="never" nodeType="tmRoot"/>
+      </p:par>
+    </p:tnLst>
+  </p:timing>
 </p:sld>
 </file>
 
@@ -4586,43 +4703,243 @@
               <a:rPr lang="en-US"/>
               <a:t>Species in communities form networks</a:t>
             </a:r>
-          </a:p>
-        </p:txBody>
-      </p:sp>
-      <p:pic>
-        <p:nvPicPr>
-          <p:cNvPr id="4" name="Picture 3" descr="networks.png"/>
-          <p:cNvPicPr>
-            <a:picLocks noChangeAspect="1"/>
-          </p:cNvPicPr>
+            <a:endParaRPr lang="en-US"/>
+          </a:p>
+        </p:txBody>
+      </p:sp>
+      <p:sp>
+        <p:nvSpPr>
+          <p:cNvPr id="4" name="Oval 3"/>
+          <p:cNvSpPr/>
           <p:nvPr/>
-        </p:nvPicPr>
-        <p:blipFill>
-          <a:blip r:embed="rId2">
-            <a:extLst>
-              <a:ext uri="{28A0092B-C50C-407E-A947-70E740481C1C}">
-                <a14:useLocalDpi xmlns:a14="http://schemas.microsoft.com/office/drawing/2010/main" val="0"/>
-              </a:ext>
-            </a:extLst>
-          </a:blip>
-          <a:stretch>
-            <a:fillRect/>
-          </a:stretch>
-        </p:blipFill>
+        </p:nvSpPr>
         <p:spPr>
           <a:xfrm>
-            <a:off x="1291421" y="1225545"/>
-            <a:ext cx="6264987" cy="5480590"/>
+            <a:off x="2540072" y="2436086"/>
+            <a:ext cx="728709" cy="707923"/>
           </a:xfrm>
-          <a:prstGeom prst="rect">
+          <a:prstGeom prst="ellipse">
             <a:avLst/>
           </a:prstGeom>
+          <a:solidFill>
+            <a:srgbClr val="C0504D"/>
+          </a:solidFill>
+          <a:ln>
+            <a:solidFill>
+              <a:schemeClr val="accent2"/>
+            </a:solidFill>
+          </a:ln>
         </p:spPr>
-      </p:pic>
+        <p:style>
+          <a:lnRef idx="1">
+            <a:schemeClr val="accent1"/>
+          </a:lnRef>
+          <a:fillRef idx="3">
+            <a:schemeClr val="accent1"/>
+          </a:fillRef>
+          <a:effectRef idx="2">
+            <a:schemeClr val="accent1"/>
+          </a:effectRef>
+          <a:fontRef idx="minor">
+            <a:schemeClr val="lt1"/>
+          </a:fontRef>
+        </p:style>
+        <p:txBody>
+          <a:bodyPr rtlCol="0" anchor="ctr"/>
+          <a:lstStyle/>
+          <a:p>
+            <a:pPr algn="ctr"/>
+            <a:endParaRPr lang="en-US"/>
+          </a:p>
+        </p:txBody>
+      </p:sp>
+      <p:sp>
+        <p:nvSpPr>
+          <p:cNvPr id="5" name="Oval 4"/>
+          <p:cNvSpPr/>
+          <p:nvPr/>
+        </p:nvSpPr>
+        <p:spPr>
+          <a:xfrm>
+            <a:off x="5669770" y="2436086"/>
+            <a:ext cx="728709" cy="707923"/>
+          </a:xfrm>
+          <a:prstGeom prst="ellipse">
+            <a:avLst/>
+          </a:prstGeom>
+          <a:solidFill>
+            <a:srgbClr val="C0504D"/>
+          </a:solidFill>
+          <a:ln>
+            <a:solidFill>
+              <a:schemeClr val="accent2"/>
+            </a:solidFill>
+          </a:ln>
+        </p:spPr>
+        <p:style>
+          <a:lnRef idx="1">
+            <a:schemeClr val="accent1"/>
+          </a:lnRef>
+          <a:fillRef idx="3">
+            <a:schemeClr val="accent1"/>
+          </a:fillRef>
+          <a:effectRef idx="2">
+            <a:schemeClr val="accent1"/>
+          </a:effectRef>
+          <a:fontRef idx="minor">
+            <a:schemeClr val="lt1"/>
+          </a:fontRef>
+        </p:style>
+        <p:txBody>
+          <a:bodyPr rtlCol="0" anchor="ctr"/>
+          <a:lstStyle/>
+          <a:p>
+            <a:pPr algn="ctr"/>
+            <a:endParaRPr lang="en-US"/>
+          </a:p>
+        </p:txBody>
+      </p:sp>
+      <p:sp>
+        <p:nvSpPr>
+          <p:cNvPr id="6" name="Oval 5"/>
+          <p:cNvSpPr/>
+          <p:nvPr/>
+        </p:nvSpPr>
+        <p:spPr>
+          <a:xfrm>
+            <a:off x="5669770" y="4566505"/>
+            <a:ext cx="728709" cy="707923"/>
+          </a:xfrm>
+          <a:prstGeom prst="ellipse">
+            <a:avLst/>
+          </a:prstGeom>
+          <a:solidFill>
+            <a:srgbClr val="C0504D"/>
+          </a:solidFill>
+          <a:ln>
+            <a:solidFill>
+              <a:schemeClr val="accent2"/>
+            </a:solidFill>
+          </a:ln>
+        </p:spPr>
+        <p:style>
+          <a:lnRef idx="1">
+            <a:schemeClr val="accent1"/>
+          </a:lnRef>
+          <a:fillRef idx="3">
+            <a:schemeClr val="accent1"/>
+          </a:fillRef>
+          <a:effectRef idx="2">
+            <a:schemeClr val="accent1"/>
+          </a:effectRef>
+          <a:fontRef idx="minor">
+            <a:schemeClr val="lt1"/>
+          </a:fontRef>
+        </p:style>
+        <p:txBody>
+          <a:bodyPr rtlCol="0" anchor="ctr"/>
+          <a:lstStyle/>
+          <a:p>
+            <a:pPr algn="ctr"/>
+            <a:endParaRPr lang="en-US"/>
+          </a:p>
+        </p:txBody>
+      </p:sp>
+      <p:grpSp>
+        <p:nvGrpSpPr>
+          <p:cNvPr id="14" name="Group 13"/>
+          <p:cNvGrpSpPr/>
+          <p:nvPr/>
+        </p:nvGrpSpPr>
+        <p:grpSpPr>
+          <a:xfrm>
+            <a:off x="3268781" y="2790048"/>
+            <a:ext cx="2400989" cy="2130419"/>
+            <a:chOff x="3268781" y="2790048"/>
+            <a:chExt cx="2400989" cy="2130419"/>
+          </a:xfrm>
+        </p:grpSpPr>
+        <p:cxnSp>
+          <p:nvCxnSpPr>
+            <p:cNvPr id="8" name="Straight Connector 7"/>
+            <p:cNvCxnSpPr>
+              <a:stCxn id="4" idx="6"/>
+              <a:endCxn id="5" idx="2"/>
+            </p:cNvCxnSpPr>
+            <p:nvPr/>
+          </p:nvCxnSpPr>
+          <p:spPr>
+            <a:xfrm>
+              <a:off x="3268781" y="2790048"/>
+              <a:ext cx="2400989" cy="0"/>
+            </a:xfrm>
+            <a:prstGeom prst="line">
+              <a:avLst/>
+            </a:prstGeom>
+            <a:ln w="57150" cmpd="sng">
+              <a:solidFill>
+                <a:schemeClr val="tx1"/>
+              </a:solidFill>
+            </a:ln>
+          </p:spPr>
+          <p:style>
+            <a:lnRef idx="2">
+              <a:schemeClr val="accent1"/>
+            </a:lnRef>
+            <a:fillRef idx="0">
+              <a:schemeClr val="accent1"/>
+            </a:fillRef>
+            <a:effectRef idx="1">
+              <a:schemeClr val="accent1"/>
+            </a:effectRef>
+            <a:fontRef idx="minor">
+              <a:schemeClr val="tx1"/>
+            </a:fontRef>
+          </p:style>
+        </p:cxnSp>
+        <p:cxnSp>
+          <p:nvCxnSpPr>
+            <p:cNvPr id="9" name="Straight Connector 8"/>
+            <p:cNvCxnSpPr>
+              <a:stCxn id="4" idx="6"/>
+              <a:endCxn id="6" idx="2"/>
+            </p:cNvCxnSpPr>
+            <p:nvPr/>
+          </p:nvCxnSpPr>
+          <p:spPr>
+            <a:xfrm>
+              <a:off x="3268781" y="2790048"/>
+              <a:ext cx="2400989" cy="2130419"/>
+            </a:xfrm>
+            <a:prstGeom prst="line">
+              <a:avLst/>
+            </a:prstGeom>
+            <a:ln w="57150" cmpd="sng">
+              <a:solidFill>
+                <a:schemeClr val="tx1"/>
+              </a:solidFill>
+            </a:ln>
+          </p:spPr>
+          <p:style>
+            <a:lnRef idx="2">
+              <a:schemeClr val="accent1"/>
+            </a:lnRef>
+            <a:fillRef idx="0">
+              <a:schemeClr val="accent1"/>
+            </a:fillRef>
+            <a:effectRef idx="1">
+              <a:schemeClr val="accent1"/>
+            </a:effectRef>
+            <a:fontRef idx="minor">
+              <a:schemeClr val="tx1"/>
+            </a:fontRef>
+          </p:style>
+        </p:cxnSp>
+      </p:grpSp>
     </p:spTree>
     <p:extLst>
       <p:ext uri="{BB962C8B-B14F-4D97-AF65-F5344CB8AC3E}">
-        <p14:creationId xmlns:p14="http://schemas.microsoft.com/office/powerpoint/2010/main" val="1104281491"/>
+        <p14:creationId xmlns:p14="http://schemas.microsoft.com/office/powerpoint/2010/main" val="4134063166"/>
       </p:ext>
     </p:extLst>
   </p:cSld>
@@ -4632,7 +4949,75 @@
   <p:timing>
     <p:tnLst>
       <p:par>
-        <p:cTn xmlns:p14="http://schemas.microsoft.com/office/powerpoint/2010/main" id="1" dur="indefinite" restart="never" nodeType="tmRoot"/>
+        <p:cTn xmlns:p14="http://schemas.microsoft.com/office/powerpoint/2010/main" id="1" dur="indefinite" restart="never" nodeType="tmRoot">
+          <p:childTnLst>
+            <p:seq concurrent="1" nextAc="seek">
+              <p:cTn id="2" dur="indefinite" nodeType="mainSeq">
+                <p:childTnLst>
+                  <p:par>
+                    <p:cTn id="3" fill="hold">
+                      <p:stCondLst>
+                        <p:cond delay="indefinite"/>
+                      </p:stCondLst>
+                      <p:childTnLst>
+                        <p:par>
+                          <p:cTn id="4" fill="hold">
+                            <p:stCondLst>
+                              <p:cond delay="0"/>
+                            </p:stCondLst>
+                            <p:childTnLst>
+                              <p:par>
+                                <p:cTn id="5" presetID="1" presetClass="entr" presetSubtype="0" fill="hold" nodeType="clickEffect">
+                                  <p:stCondLst>
+                                    <p:cond delay="0"/>
+                                  </p:stCondLst>
+                                  <p:childTnLst>
+                                    <p:set>
+                                      <p:cBhvr>
+                                        <p:cTn id="6" dur="1" fill="hold">
+                                          <p:stCondLst>
+                                            <p:cond delay="0"/>
+                                          </p:stCondLst>
+                                        </p:cTn>
+                                        <p:tgtEl>
+                                          <p:spTgt spid="14"/>
+                                        </p:tgtEl>
+                                        <p:attrNameLst>
+                                          <p:attrName>style.visibility</p:attrName>
+                                        </p:attrNameLst>
+                                      </p:cBhvr>
+                                      <p:to>
+                                        <p:strVal val="visible"/>
+                                      </p:to>
+                                    </p:set>
+                                  </p:childTnLst>
+                                </p:cTn>
+                              </p:par>
+                            </p:childTnLst>
+                          </p:cTn>
+                        </p:par>
+                      </p:childTnLst>
+                    </p:cTn>
+                  </p:par>
+                </p:childTnLst>
+              </p:cTn>
+              <p:prevCondLst>
+                <p:cond evt="onPrev" delay="0">
+                  <p:tgtEl>
+                    <p:sldTgt/>
+                  </p:tgtEl>
+                </p:cond>
+              </p:prevCondLst>
+              <p:nextCondLst>
+                <p:cond evt="onNext" delay="0">
+                  <p:tgtEl>
+                    <p:sldTgt/>
+                  </p:tgtEl>
+                </p:cond>
+              </p:nextCondLst>
+            </p:seq>
+          </p:childTnLst>
+        </p:cTn>
       </p:par>
     </p:tnLst>
   </p:timing>
@@ -4905,6 +5290,13 @@
   <p:clrMapOvr>
     <a:masterClrMapping/>
   </p:clrMapOvr>
+  <p:timing>
+    <p:tnLst>
+      <p:par>
+        <p:cTn xmlns:p14="http://schemas.microsoft.com/office/powerpoint/2010/main" id="1" dur="indefinite" restart="never" nodeType="tmRoot"/>
+      </p:par>
+    </p:tnLst>
+  </p:timing>
 </p:sld>
 </file>
 
@@ -4971,18 +5363,362 @@
             <a:endParaRPr lang="en-US"/>
           </a:p>
           <a:p>
+            <a:endParaRPr lang="en-US"/>
+          </a:p>
+          <a:p>
+            <a:r>
+              <a:rPr lang="en-US"/>
+              <a:t>Phenology</a:t>
+            </a:r>
+          </a:p>
+          <a:p>
+            <a:endParaRPr lang="en-US"/>
+          </a:p>
+          <a:p>
+            <a:endParaRPr lang="en-US"/>
+          </a:p>
+          <a:p>
             <a:r>
               <a:rPr lang="en-US"/>
               <a:t>Phylogeny</a:t>
             </a:r>
           </a:p>
-          <a:p>
-            <a:endParaRPr lang="en-US"/>
-          </a:p>
-          <a:p>
-            <a:r>
-              <a:rPr lang="en-US"/>
-              <a:t>Phenology</a:t>
+        </p:txBody>
+      </p:sp>
+      <p:pic>
+        <p:nvPicPr>
+          <p:cNvPr id="5" name="Picture 4"/>
+          <p:cNvPicPr>
+            <a:picLocks noChangeAspect="1"/>
+          </p:cNvPicPr>
+          <p:nvPr/>
+        </p:nvPicPr>
+        <p:blipFill>
+          <a:blip r:embed="rId2"/>
+          <a:stretch>
+            <a:fillRect/>
+          </a:stretch>
+        </p:blipFill>
+        <p:spPr>
+          <a:xfrm>
+            <a:off x="4532768" y="1483326"/>
+            <a:ext cx="1649606" cy="966226"/>
+          </a:xfrm>
+          <a:prstGeom prst="rect">
+            <a:avLst/>
+          </a:prstGeom>
+        </p:spPr>
+      </p:pic>
+      <p:sp>
+        <p:nvSpPr>
+          <p:cNvPr id="6" name="TextBox 5"/>
+          <p:cNvSpPr txBox="1"/>
+          <p:nvPr/>
+        </p:nvSpPr>
+        <p:spPr>
+          <a:xfrm>
+            <a:off x="350359" y="6384125"/>
+            <a:ext cx="3589632" cy="253916"/>
+          </a:xfrm>
+          <a:prstGeom prst="rect">
+            <a:avLst/>
+          </a:prstGeom>
+          <a:noFill/>
+        </p:spPr>
+        <p:txBody>
+          <a:bodyPr wrap="none" rtlCol="0">
+            <a:spAutoFit/>
+          </a:bodyPr>
+          <a:lstStyle/>
+          <a:p>
+            <a:r>
+              <a:rPr lang="en-US" sz="1050"/>
+              <a:t>http://www.gutenberg.org/files/33874/33874-h/33874-h.htm</a:t>
+            </a:r>
+          </a:p>
+        </p:txBody>
+      </p:sp>
+      <p:grpSp>
+        <p:nvGrpSpPr>
+          <p:cNvPr id="25" name="Group 24"/>
+          <p:cNvGrpSpPr/>
+          <p:nvPr/>
+        </p:nvGrpSpPr>
+        <p:grpSpPr>
+          <a:xfrm rot="5400000">
+            <a:off x="4805450" y="4931468"/>
+            <a:ext cx="1154111" cy="966794"/>
+            <a:chOff x="4748213" y="3146418"/>
+            <a:chExt cx="1154111" cy="966794"/>
+          </a:xfrm>
+        </p:grpSpPr>
+        <p:cxnSp>
+          <p:nvCxnSpPr>
+            <p:cNvPr id="15" name="Straight Connector 14"/>
+            <p:cNvCxnSpPr/>
+            <p:nvPr/>
+          </p:nvCxnSpPr>
+          <p:spPr>
+            <a:xfrm flipH="1">
+              <a:off x="5513387" y="3763962"/>
+              <a:ext cx="388937" cy="0"/>
+            </a:xfrm>
+            <a:prstGeom prst="line">
+              <a:avLst/>
+            </a:prstGeom>
+            <a:ln w="57150" cmpd="sng"/>
+          </p:spPr>
+          <p:style>
+            <a:lnRef idx="2">
+              <a:schemeClr val="accent1"/>
+            </a:lnRef>
+            <a:fillRef idx="0">
+              <a:schemeClr val="accent1"/>
+            </a:fillRef>
+            <a:effectRef idx="1">
+              <a:schemeClr val="accent1"/>
+            </a:effectRef>
+            <a:fontRef idx="minor">
+              <a:schemeClr val="tx1"/>
+            </a:fontRef>
+          </p:style>
+        </p:cxnSp>
+        <p:cxnSp>
+          <p:nvCxnSpPr>
+            <p:cNvPr id="16" name="Straight Connector 15"/>
+            <p:cNvCxnSpPr/>
+            <p:nvPr/>
+          </p:nvCxnSpPr>
+          <p:spPr>
+            <a:xfrm rot="16200000" flipH="1" flipV="1">
+              <a:off x="5162550" y="3763962"/>
+              <a:ext cx="698500" cy="0"/>
+            </a:xfrm>
+            <a:prstGeom prst="line">
+              <a:avLst/>
+            </a:prstGeom>
+            <a:ln w="57150" cmpd="sng"/>
+          </p:spPr>
+          <p:style>
+            <a:lnRef idx="2">
+              <a:schemeClr val="accent1"/>
+            </a:lnRef>
+            <a:fillRef idx="0">
+              <a:schemeClr val="accent1"/>
+            </a:fillRef>
+            <a:effectRef idx="1">
+              <a:schemeClr val="accent1"/>
+            </a:effectRef>
+            <a:fontRef idx="minor">
+              <a:schemeClr val="tx1"/>
+            </a:fontRef>
+          </p:style>
+        </p:cxnSp>
+        <p:cxnSp>
+          <p:nvCxnSpPr>
+            <p:cNvPr id="17" name="Straight Connector 16"/>
+            <p:cNvCxnSpPr/>
+            <p:nvPr/>
+          </p:nvCxnSpPr>
+          <p:spPr>
+            <a:xfrm flipH="1">
+              <a:off x="5137150" y="3416299"/>
+              <a:ext cx="388937" cy="0"/>
+            </a:xfrm>
+            <a:prstGeom prst="line">
+              <a:avLst/>
+            </a:prstGeom>
+            <a:ln w="57150" cmpd="sng"/>
+          </p:spPr>
+          <p:style>
+            <a:lnRef idx="2">
+              <a:schemeClr val="accent1"/>
+            </a:lnRef>
+            <a:fillRef idx="0">
+              <a:schemeClr val="accent1"/>
+            </a:fillRef>
+            <a:effectRef idx="1">
+              <a:schemeClr val="accent1"/>
+            </a:effectRef>
+            <a:fontRef idx="minor">
+              <a:schemeClr val="tx1"/>
+            </a:fontRef>
+          </p:style>
+        </p:cxnSp>
+        <p:cxnSp>
+          <p:nvCxnSpPr>
+            <p:cNvPr id="18" name="Straight Connector 17"/>
+            <p:cNvCxnSpPr/>
+            <p:nvPr/>
+          </p:nvCxnSpPr>
+          <p:spPr>
+            <a:xfrm flipV="1">
+              <a:off x="4748213" y="4090987"/>
+              <a:ext cx="777875" cy="1587"/>
+            </a:xfrm>
+            <a:prstGeom prst="line">
+              <a:avLst/>
+            </a:prstGeom>
+            <a:ln w="57150" cmpd="sng"/>
+          </p:spPr>
+          <p:style>
+            <a:lnRef idx="2">
+              <a:schemeClr val="accent1"/>
+            </a:lnRef>
+            <a:fillRef idx="0">
+              <a:schemeClr val="accent1"/>
+            </a:fillRef>
+            <a:effectRef idx="1">
+              <a:schemeClr val="accent1"/>
+            </a:effectRef>
+            <a:fontRef idx="minor">
+              <a:schemeClr val="tx1"/>
+            </a:fontRef>
+          </p:style>
+        </p:cxnSp>
+        <p:cxnSp>
+          <p:nvCxnSpPr>
+            <p:cNvPr id="19" name="Straight Connector 18"/>
+            <p:cNvCxnSpPr/>
+            <p:nvPr/>
+          </p:nvCxnSpPr>
+          <p:spPr>
+            <a:xfrm>
+              <a:off x="5137150" y="3146418"/>
+              <a:ext cx="0" cy="528639"/>
+            </a:xfrm>
+            <a:prstGeom prst="line">
+              <a:avLst/>
+            </a:prstGeom>
+            <a:ln w="57150" cmpd="sng"/>
+          </p:spPr>
+          <p:style>
+            <a:lnRef idx="2">
+              <a:schemeClr val="accent1"/>
+            </a:lnRef>
+            <a:fillRef idx="0">
+              <a:schemeClr val="accent1"/>
+            </a:fillRef>
+            <a:effectRef idx="1">
+              <a:schemeClr val="accent1"/>
+            </a:effectRef>
+            <a:fontRef idx="minor">
+              <a:schemeClr val="tx1"/>
+            </a:fontRef>
+          </p:style>
+        </p:cxnSp>
+        <p:cxnSp>
+          <p:nvCxnSpPr>
+            <p:cNvPr id="21" name="Straight Connector 20"/>
+            <p:cNvCxnSpPr/>
+            <p:nvPr/>
+          </p:nvCxnSpPr>
+          <p:spPr>
+            <a:xfrm flipH="1">
+              <a:off x="4748213" y="3675057"/>
+              <a:ext cx="388937" cy="0"/>
+            </a:xfrm>
+            <a:prstGeom prst="line">
+              <a:avLst/>
+            </a:prstGeom>
+            <a:ln w="57150" cmpd="sng"/>
+          </p:spPr>
+          <p:style>
+            <a:lnRef idx="2">
+              <a:schemeClr val="accent1"/>
+            </a:lnRef>
+            <a:fillRef idx="0">
+              <a:schemeClr val="accent1"/>
+            </a:fillRef>
+            <a:effectRef idx="1">
+              <a:schemeClr val="accent1"/>
+            </a:effectRef>
+            <a:fontRef idx="minor">
+              <a:schemeClr val="tx1"/>
+            </a:fontRef>
+          </p:style>
+        </p:cxnSp>
+        <p:cxnSp>
+          <p:nvCxnSpPr>
+            <p:cNvPr id="22" name="Straight Connector 21"/>
+            <p:cNvCxnSpPr/>
+            <p:nvPr/>
+          </p:nvCxnSpPr>
+          <p:spPr>
+            <a:xfrm flipH="1">
+              <a:off x="4748213" y="3146418"/>
+              <a:ext cx="388937" cy="0"/>
+            </a:xfrm>
+            <a:prstGeom prst="line">
+              <a:avLst/>
+            </a:prstGeom>
+            <a:ln w="57150" cmpd="sng"/>
+          </p:spPr>
+          <p:style>
+            <a:lnRef idx="2">
+              <a:schemeClr val="accent1"/>
+            </a:lnRef>
+            <a:fillRef idx="0">
+              <a:schemeClr val="accent1"/>
+            </a:fillRef>
+            <a:effectRef idx="1">
+              <a:schemeClr val="accent1"/>
+            </a:effectRef>
+            <a:fontRef idx="minor">
+              <a:schemeClr val="tx1"/>
+            </a:fontRef>
+          </p:style>
+        </p:cxnSp>
+      </p:grpSp>
+      <p:pic>
+        <p:nvPicPr>
+          <p:cNvPr id="26" name="Picture 25"/>
+          <p:cNvPicPr>
+            <a:picLocks noChangeAspect="1"/>
+          </p:cNvPicPr>
+          <p:nvPr/>
+        </p:nvPicPr>
+        <p:blipFill>
+          <a:blip r:embed="rId3"/>
+          <a:stretch>
+            <a:fillRect/>
+          </a:stretch>
+        </p:blipFill>
+        <p:spPr>
+          <a:xfrm>
+            <a:off x="4372624" y="2764625"/>
+            <a:ext cx="1809750" cy="1809750"/>
+          </a:xfrm>
+          <a:prstGeom prst="rect">
+            <a:avLst/>
+          </a:prstGeom>
+        </p:spPr>
+      </p:pic>
+      <p:sp>
+        <p:nvSpPr>
+          <p:cNvPr id="27" name="TextBox 26"/>
+          <p:cNvSpPr txBox="1"/>
+          <p:nvPr/>
+        </p:nvSpPr>
+        <p:spPr>
+          <a:xfrm>
+            <a:off x="350359" y="6546334"/>
+            <a:ext cx="5032147" cy="253916"/>
+          </a:xfrm>
+          <a:prstGeom prst="rect">
+            <a:avLst/>
+          </a:prstGeom>
+          <a:noFill/>
+        </p:spPr>
+        <p:txBody>
+          <a:bodyPr wrap="none" rtlCol="0">
+            <a:spAutoFit/>
+          </a:bodyPr>
+          <a:lstStyle/>
+          <a:p>
+            <a:r>
+              <a:rPr lang="en-US" sz="1050"/>
+              <a:t>http://contently.com/strategist/2012/01/17/stay-on-track-with-your-editorial-calendar/</a:t>
             </a:r>
           </a:p>
         </p:txBody>
@@ -5335,8 +6071,13 @@
           <a:p>
             <a:r>
               <a:rPr lang="en-US"/>
-              <a:t>Specialization</a:t>
-            </a:r>
+              <a:t>Specialization </a:t>
+            </a:r>
+            <a:r>
+              <a:rPr lang="en-US" sz="2400"/>
+              <a:t>(accounts for interaction intensity)</a:t>
+            </a:r>
+            <a:endParaRPr lang="en-US"/>
           </a:p>
           <a:p>
             <a:r>

</xml_diff>